<commit_message>
updated NuGet pkgs, presentations
</commit_message>
<xml_diff>
--- a/Setup.pptx
+++ b/Setup.pptx
@@ -3684,240 +3684,6 @@
       <dsp:cNvGrpSpPr/>
     </dsp:nvGrpSpPr>
     <dsp:grpSpPr/>
-    <dsp:sp modelId="{C743E412-C2D4-40E5-9E7C-818B8C561C2D}">
-      <dsp:nvSpPr>
-        <dsp:cNvPr id="0" name=""/>
-        <dsp:cNvSpPr/>
-      </dsp:nvSpPr>
-      <dsp:spPr>
-        <a:xfrm>
-          <a:off x="3423317" y="1247382"/>
-          <a:ext cx="1438796" cy="2737404"/>
-        </a:xfrm>
-        <a:prstGeom prst="rect">
-          <a:avLst/>
-        </a:prstGeom>
-        <a:solidFill>
-          <a:schemeClr val="accent4">
-            <a:hueOff val="0"/>
-            <a:satOff val="0"/>
-            <a:lumOff val="0"/>
-            <a:alphaOff val="0"/>
-          </a:schemeClr>
-        </a:solidFill>
-        <a:ln w="12700" cap="flat" cmpd="sng" algn="ctr">
-          <a:solidFill>
-            <a:schemeClr val="lt1">
-              <a:hueOff val="0"/>
-              <a:satOff val="0"/>
-              <a:lumOff val="0"/>
-              <a:alphaOff val="0"/>
-            </a:schemeClr>
-          </a:solidFill>
-          <a:prstDash val="solid"/>
-          <a:miter lim="800000"/>
-        </a:ln>
-        <a:effectLst/>
-      </dsp:spPr>
-      <dsp:style>
-        <a:lnRef idx="2">
-          <a:scrgbClr r="0" g="0" b="0"/>
-        </a:lnRef>
-        <a:fillRef idx="1">
-          <a:scrgbClr r="0" g="0" b="0"/>
-        </a:fillRef>
-        <a:effectRef idx="0">
-          <a:scrgbClr r="0" g="0" b="0"/>
-        </a:effectRef>
-        <a:fontRef idx="minor">
-          <a:schemeClr val="lt1"/>
-        </a:fontRef>
-      </dsp:style>
-      <dsp:txBody>
-        <a:bodyPr spcFirstLastPara="0" vert="horz" wrap="square" lIns="91440" tIns="0" rIns="137160" bIns="30480" numCol="1" spcCol="1270" anchor="ctr" anchorCtr="0">
-          <a:noAutofit/>
-        </a:bodyPr>
-        <a:lstStyle/>
-        <a:p>
-          <a:pPr lvl="0" algn="r" defTabSz="1066800">
-            <a:lnSpc>
-              <a:spcPct val="90000"/>
-            </a:lnSpc>
-            <a:spcBef>
-              <a:spcPct val="0"/>
-            </a:spcBef>
-            <a:spcAft>
-              <a:spcPct val="35000"/>
-            </a:spcAft>
-          </a:pPr>
-          <a:r>
-            <a:rPr lang="de-CH" sz="2400" kern="1200" dirty="0" smtClean="0"/>
-            <a:t>R3</a:t>
-          </a:r>
-          <a:endParaRPr lang="de-CH" sz="2400" kern="1200" dirty="0"/>
-        </a:p>
-      </dsp:txBody>
-      <dsp:txXfrm rot="16200000">
-        <a:off x="3407711" y="2292171"/>
-        <a:ext cx="2463663" cy="374087"/>
-      </dsp:txXfrm>
-    </dsp:sp>
-    <dsp:sp modelId="{EBAF9144-01F2-43CB-A667-45A2753881CC}">
-      <dsp:nvSpPr>
-        <dsp:cNvPr id="0" name=""/>
-        <dsp:cNvSpPr/>
-      </dsp:nvSpPr>
-      <dsp:spPr>
-        <a:xfrm>
-          <a:off x="1855872" y="785612"/>
-          <a:ext cx="1438796" cy="3197714"/>
-        </a:xfrm>
-        <a:prstGeom prst="rect">
-          <a:avLst/>
-        </a:prstGeom>
-        <a:solidFill>
-          <a:schemeClr val="accent3">
-            <a:hueOff val="0"/>
-            <a:satOff val="0"/>
-            <a:lumOff val="0"/>
-            <a:alphaOff val="0"/>
-          </a:schemeClr>
-        </a:solidFill>
-        <a:ln w="12700" cap="flat" cmpd="sng" algn="ctr">
-          <a:solidFill>
-            <a:schemeClr val="lt1">
-              <a:hueOff val="0"/>
-              <a:satOff val="0"/>
-              <a:lumOff val="0"/>
-              <a:alphaOff val="0"/>
-            </a:schemeClr>
-          </a:solidFill>
-          <a:prstDash val="solid"/>
-          <a:miter lim="800000"/>
-        </a:ln>
-        <a:effectLst/>
-      </dsp:spPr>
-      <dsp:style>
-        <a:lnRef idx="2">
-          <a:scrgbClr r="0" g="0" b="0"/>
-        </a:lnRef>
-        <a:fillRef idx="1">
-          <a:scrgbClr r="0" g="0" b="0"/>
-        </a:fillRef>
-        <a:effectRef idx="0">
-          <a:scrgbClr r="0" g="0" b="0"/>
-        </a:effectRef>
-        <a:fontRef idx="minor">
-          <a:schemeClr val="lt1"/>
-        </a:fontRef>
-      </dsp:style>
-      <dsp:txBody>
-        <a:bodyPr spcFirstLastPara="0" vert="horz" wrap="square" lIns="91440" tIns="0" rIns="137160" bIns="30480" numCol="1" spcCol="1270" anchor="ctr" anchorCtr="0">
-          <a:noAutofit/>
-        </a:bodyPr>
-        <a:lstStyle/>
-        <a:p>
-          <a:pPr lvl="0" algn="r" defTabSz="1066800">
-            <a:lnSpc>
-              <a:spcPct val="90000"/>
-            </a:lnSpc>
-            <a:spcBef>
-              <a:spcPct val="0"/>
-            </a:spcBef>
-            <a:spcAft>
-              <a:spcPct val="35000"/>
-            </a:spcAft>
-          </a:pPr>
-          <a:r>
-            <a:rPr lang="de-CH" sz="2400" kern="1200" dirty="0" smtClean="0"/>
-            <a:t>R2</a:t>
-          </a:r>
-          <a:endParaRPr lang="de-CH" sz="2400" kern="1200" dirty="0"/>
-        </a:p>
-      </dsp:txBody>
-      <dsp:txXfrm rot="16200000">
-        <a:off x="1633127" y="2037540"/>
-        <a:ext cx="2877942" cy="374087"/>
-      </dsp:txXfrm>
-    </dsp:sp>
-    <dsp:sp modelId="{68193C31-698B-4BB7-8FC7-C5843CC150D8}">
-      <dsp:nvSpPr>
-        <dsp:cNvPr id="0" name=""/>
-        <dsp:cNvSpPr/>
-      </dsp:nvSpPr>
-      <dsp:spPr>
-        <a:xfrm>
-          <a:off x="283796" y="350489"/>
-          <a:ext cx="1438796" cy="3632837"/>
-        </a:xfrm>
-        <a:prstGeom prst="rect">
-          <a:avLst/>
-        </a:prstGeom>
-        <a:solidFill>
-          <a:schemeClr val="accent2">
-            <a:hueOff val="0"/>
-            <a:satOff val="0"/>
-            <a:lumOff val="0"/>
-            <a:alphaOff val="0"/>
-          </a:schemeClr>
-        </a:solidFill>
-        <a:ln w="12700" cap="flat" cmpd="sng" algn="ctr">
-          <a:solidFill>
-            <a:schemeClr val="lt1">
-              <a:hueOff val="0"/>
-              <a:satOff val="0"/>
-              <a:lumOff val="0"/>
-              <a:alphaOff val="0"/>
-            </a:schemeClr>
-          </a:solidFill>
-          <a:prstDash val="solid"/>
-          <a:miter lim="800000"/>
-        </a:ln>
-        <a:effectLst/>
-      </dsp:spPr>
-      <dsp:style>
-        <a:lnRef idx="2">
-          <a:scrgbClr r="0" g="0" b="0"/>
-        </a:lnRef>
-        <a:fillRef idx="1">
-          <a:scrgbClr r="0" g="0" b="0"/>
-        </a:fillRef>
-        <a:effectRef idx="0">
-          <a:scrgbClr r="0" g="0" b="0"/>
-        </a:effectRef>
-        <a:fontRef idx="minor">
-          <a:schemeClr val="lt1"/>
-        </a:fontRef>
-      </dsp:style>
-      <dsp:txBody>
-        <a:bodyPr spcFirstLastPara="0" vert="horz" wrap="square" lIns="91440" tIns="0" rIns="137160" bIns="30480" numCol="1" spcCol="1270" anchor="ctr" anchorCtr="0">
-          <a:noAutofit/>
-        </a:bodyPr>
-        <a:lstStyle/>
-        <a:p>
-          <a:pPr lvl="0" algn="r" defTabSz="1066800">
-            <a:lnSpc>
-              <a:spcPct val="90000"/>
-            </a:lnSpc>
-            <a:spcBef>
-              <a:spcPct val="0"/>
-            </a:spcBef>
-            <a:spcAft>
-              <a:spcPct val="35000"/>
-            </a:spcAft>
-          </a:pPr>
-          <a:r>
-            <a:rPr lang="de-CH" sz="2400" kern="1200" dirty="0" smtClean="0"/>
-            <a:t>R1</a:t>
-          </a:r>
-          <a:endParaRPr lang="de-CH" sz="2400" kern="1200" dirty="0"/>
-        </a:p>
-      </dsp:txBody>
-      <dsp:txXfrm rot="16200000">
-        <a:off x="-134753" y="1798222"/>
-        <a:ext cx="3269553" cy="374087"/>
-      </dsp:txXfrm>
-    </dsp:sp>
   </dsp:spTree>
 </dsp:drawing>
 </file>
@@ -8056,7 +7822,7 @@
           <a:p>
             <a:fld id="{3F1E0B3F-E8A9-40D1-8C96-ACD5C8333B3A}" type="datetimeFigureOut">
               <a:rPr lang="de-CH" smtClean="0"/>
-              <a:t>07.12.2016</a:t>
+              <a:t>12.12.2016</a:t>
             </a:fld>
             <a:endParaRPr lang="de-CH"/>
           </a:p>
@@ -8226,7 +7992,7 @@
           <a:p>
             <a:fld id="{3F1E0B3F-E8A9-40D1-8C96-ACD5C8333B3A}" type="datetimeFigureOut">
               <a:rPr lang="de-CH" smtClean="0"/>
-              <a:t>07.12.2016</a:t>
+              <a:t>12.12.2016</a:t>
             </a:fld>
             <a:endParaRPr lang="de-CH"/>
           </a:p>
@@ -8406,7 +8172,7 @@
           <a:p>
             <a:fld id="{3F1E0B3F-E8A9-40D1-8C96-ACD5C8333B3A}" type="datetimeFigureOut">
               <a:rPr lang="de-CH" smtClean="0"/>
-              <a:t>07.12.2016</a:t>
+              <a:t>12.12.2016</a:t>
             </a:fld>
             <a:endParaRPr lang="de-CH"/>
           </a:p>
@@ -8576,7 +8342,7 @@
           <a:p>
             <a:fld id="{3F1E0B3F-E8A9-40D1-8C96-ACD5C8333B3A}" type="datetimeFigureOut">
               <a:rPr lang="de-CH" smtClean="0"/>
-              <a:t>07.12.2016</a:t>
+              <a:t>12.12.2016</a:t>
             </a:fld>
             <a:endParaRPr lang="de-CH"/>
           </a:p>
@@ -8822,7 +8588,7 @@
           <a:p>
             <a:fld id="{3F1E0B3F-E8A9-40D1-8C96-ACD5C8333B3A}" type="datetimeFigureOut">
               <a:rPr lang="de-CH" smtClean="0"/>
-              <a:t>07.12.2016</a:t>
+              <a:t>12.12.2016</a:t>
             </a:fld>
             <a:endParaRPr lang="de-CH"/>
           </a:p>
@@ -9054,7 +8820,7 @@
           <a:p>
             <a:fld id="{3F1E0B3F-E8A9-40D1-8C96-ACD5C8333B3A}" type="datetimeFigureOut">
               <a:rPr lang="de-CH" smtClean="0"/>
-              <a:t>07.12.2016</a:t>
+              <a:t>12.12.2016</a:t>
             </a:fld>
             <a:endParaRPr lang="de-CH"/>
           </a:p>
@@ -9421,7 +9187,7 @@
           <a:p>
             <a:fld id="{3F1E0B3F-E8A9-40D1-8C96-ACD5C8333B3A}" type="datetimeFigureOut">
               <a:rPr lang="de-CH" smtClean="0"/>
-              <a:t>07.12.2016</a:t>
+              <a:t>12.12.2016</a:t>
             </a:fld>
             <a:endParaRPr lang="de-CH"/>
           </a:p>
@@ -9539,7 +9305,7 @@
           <a:p>
             <a:fld id="{3F1E0B3F-E8A9-40D1-8C96-ACD5C8333B3A}" type="datetimeFigureOut">
               <a:rPr lang="de-CH" smtClean="0"/>
-              <a:t>07.12.2016</a:t>
+              <a:t>12.12.2016</a:t>
             </a:fld>
             <a:endParaRPr lang="de-CH"/>
           </a:p>
@@ -9634,7 +9400,7 @@
           <a:p>
             <a:fld id="{3F1E0B3F-E8A9-40D1-8C96-ACD5C8333B3A}" type="datetimeFigureOut">
               <a:rPr lang="de-CH" smtClean="0"/>
-              <a:t>07.12.2016</a:t>
+              <a:t>12.12.2016</a:t>
             </a:fld>
             <a:endParaRPr lang="de-CH"/>
           </a:p>
@@ -9911,7 +9677,7 @@
           <a:p>
             <a:fld id="{3F1E0B3F-E8A9-40D1-8C96-ACD5C8333B3A}" type="datetimeFigureOut">
               <a:rPr lang="de-CH" smtClean="0"/>
-              <a:t>07.12.2016</a:t>
+              <a:t>12.12.2016</a:t>
             </a:fld>
             <a:endParaRPr lang="de-CH"/>
           </a:p>
@@ -10164,7 +9930,7 @@
           <a:p>
             <a:fld id="{3F1E0B3F-E8A9-40D1-8C96-ACD5C8333B3A}" type="datetimeFigureOut">
               <a:rPr lang="de-CH" smtClean="0"/>
-              <a:t>07.12.2016</a:t>
+              <a:t>12.12.2016</a:t>
             </a:fld>
             <a:endParaRPr lang="de-CH"/>
           </a:p>
@@ -10377,7 +10143,7 @@
           <a:p>
             <a:fld id="{3F1E0B3F-E8A9-40D1-8C96-ACD5C8333B3A}" type="datetimeFigureOut">
               <a:rPr lang="de-CH" smtClean="0"/>
-              <a:t>07.12.2016</a:t>
+              <a:t>12.12.2016</a:t>
             </a:fld>
             <a:endParaRPr lang="de-CH"/>
           </a:p>
@@ -10980,8 +10746,13 @@
           <a:p>
             <a:r>
               <a:rPr lang="de-CH" dirty="0" smtClean="0"/>
-              <a:t>Server Setup</a:t>
+              <a:t>Server </a:t>
             </a:r>
+            <a:r>
+              <a:rPr lang="de-CH" dirty="0" smtClean="0"/>
+              <a:t>Setup &amp; Requirments</a:t>
+            </a:r>
+            <a:endParaRPr lang="de-CH" dirty="0" smtClean="0"/>
           </a:p>
           <a:p>
             <a:pPr lvl="1"/>

</xml_diff>